<commit_message>
Branding updates in decks
</commit_message>
<xml_diff>
--- a/Presentation/ASPNET-and-VS-Web-Tooling/ASPNET-and-VS-Web-Tooling.pptx
+++ b/Presentation/ASPNET-and-VS-Web-Tooling/ASPNET-and-VS-Web-Tooling.pptx
@@ -136,6 +136,9 @@
   <p:extLst>
     <p:ext uri="{EFAFB233-063F-42B5-8137-9DF3F51BA10A}">
       <p15:sldGuideLst xmlns:p15="http://schemas.microsoft.com/office/powerpoint/2012/main"/>
+    </p:ext>
+    <p:ext uri="{2D200454-40CA-4A62-9FC3-DE9A4176ACB9}">
+      <p15:notesGuideLst xmlns:p15="http://schemas.microsoft.com/office/powerpoint/2012/main"/>
     </p:ext>
   </p:extLst>
 </p:presentation>
@@ -6525,318 +6528,6 @@
       <dsp:cNvGrpSpPr/>
     </dsp:nvGrpSpPr>
     <dsp:grpSpPr/>
-    <dsp:sp modelId="{06BBD92D-FE5E-46CB-9773-5C1F67E88422}">
-      <dsp:nvSpPr>
-        <dsp:cNvPr id="0" name=""/>
-        <dsp:cNvSpPr/>
-      </dsp:nvSpPr>
-      <dsp:spPr>
-        <a:xfrm>
-          <a:off x="1043245" y="1559"/>
-          <a:ext cx="3251844" cy="1951106"/>
-        </a:xfrm>
-        <a:prstGeom prst="rect">
-          <a:avLst/>
-        </a:prstGeom>
-        <a:solidFill>
-          <a:schemeClr val="dk2">
-            <a:hueOff val="0"/>
-            <a:satOff val="0"/>
-            <a:lumOff val="0"/>
-            <a:alphaOff val="0"/>
-          </a:schemeClr>
-        </a:solidFill>
-        <a:ln w="12700" cap="flat" cmpd="sng" algn="ctr">
-          <a:solidFill>
-            <a:schemeClr val="lt2">
-              <a:hueOff val="0"/>
-              <a:satOff val="0"/>
-              <a:lumOff val="0"/>
-              <a:alphaOff val="0"/>
-            </a:schemeClr>
-          </a:solidFill>
-          <a:prstDash val="solid"/>
-          <a:miter lim="800000"/>
-        </a:ln>
-        <a:effectLst/>
-      </dsp:spPr>
-      <dsp:style>
-        <a:lnRef idx="2">
-          <a:scrgbClr r="0" g="0" b="0"/>
-        </a:lnRef>
-        <a:fillRef idx="1">
-          <a:scrgbClr r="0" g="0" b="0"/>
-        </a:fillRef>
-        <a:effectRef idx="0">
-          <a:scrgbClr r="0" g="0" b="0"/>
-        </a:effectRef>
-        <a:fontRef idx="minor">
-          <a:schemeClr val="lt1"/>
-        </a:fontRef>
-      </dsp:style>
-      <dsp:txBody>
-        <a:bodyPr spcFirstLastPara="0" vert="horz" wrap="square" lIns="175260" tIns="175260" rIns="175260" bIns="175260" numCol="1" spcCol="1270" anchor="ctr" anchorCtr="0">
-          <a:noAutofit/>
-        </a:bodyPr>
-        <a:lstStyle/>
-        <a:p>
-          <a:pPr lvl="0" algn="ctr" defTabSz="2044700" rtl="0">
-            <a:lnSpc>
-              <a:spcPct val="90000"/>
-            </a:lnSpc>
-            <a:spcBef>
-              <a:spcPct val="0"/>
-            </a:spcBef>
-            <a:spcAft>
-              <a:spcPct val="35000"/>
-            </a:spcAft>
-          </a:pPr>
-          <a:r>
-            <a:rPr lang="en-US" sz="4600" kern="1200" baseline="0" smtClean="0"/>
-            <a:t>Bootstrap templates</a:t>
-          </a:r>
-          <a:endParaRPr lang="en-US" sz="4600" kern="1200"/>
-        </a:p>
-      </dsp:txBody>
-      <dsp:txXfrm>
-        <a:off x="1043245" y="1559"/>
-        <a:ext cx="3251844" cy="1951106"/>
-      </dsp:txXfrm>
-    </dsp:sp>
-    <dsp:sp modelId="{06126733-B6E7-4AC8-B919-E10A89212D89}">
-      <dsp:nvSpPr>
-        <dsp:cNvPr id="0" name=""/>
-        <dsp:cNvSpPr/>
-      </dsp:nvSpPr>
-      <dsp:spPr>
-        <a:xfrm>
-          <a:off x="4620275" y="1559"/>
-          <a:ext cx="3251844" cy="1951106"/>
-        </a:xfrm>
-        <a:prstGeom prst="rect">
-          <a:avLst/>
-        </a:prstGeom>
-        <a:solidFill>
-          <a:schemeClr val="dk2">
-            <a:hueOff val="0"/>
-            <a:satOff val="0"/>
-            <a:lumOff val="0"/>
-            <a:alphaOff val="0"/>
-          </a:schemeClr>
-        </a:solidFill>
-        <a:ln w="12700" cap="flat" cmpd="sng" algn="ctr">
-          <a:solidFill>
-            <a:schemeClr val="lt2">
-              <a:hueOff val="0"/>
-              <a:satOff val="0"/>
-              <a:lumOff val="0"/>
-              <a:alphaOff val="0"/>
-            </a:schemeClr>
-          </a:solidFill>
-          <a:prstDash val="solid"/>
-          <a:miter lim="800000"/>
-        </a:ln>
-        <a:effectLst/>
-      </dsp:spPr>
-      <dsp:style>
-        <a:lnRef idx="2">
-          <a:scrgbClr r="0" g="0" b="0"/>
-        </a:lnRef>
-        <a:fillRef idx="1">
-          <a:scrgbClr r="0" g="0" b="0"/>
-        </a:fillRef>
-        <a:effectRef idx="0">
-          <a:scrgbClr r="0" g="0" b="0"/>
-        </a:effectRef>
-        <a:fontRef idx="minor">
-          <a:schemeClr val="lt1"/>
-        </a:fontRef>
-      </dsp:style>
-      <dsp:txBody>
-        <a:bodyPr spcFirstLastPara="0" vert="horz" wrap="square" lIns="175260" tIns="175260" rIns="175260" bIns="175260" numCol="1" spcCol="1270" anchor="ctr" anchorCtr="0">
-          <a:noAutofit/>
-        </a:bodyPr>
-        <a:lstStyle/>
-        <a:p>
-          <a:pPr lvl="0" algn="ctr" defTabSz="2044700" rtl="0">
-            <a:lnSpc>
-              <a:spcPct val="90000"/>
-            </a:lnSpc>
-            <a:spcBef>
-              <a:spcPct val="0"/>
-            </a:spcBef>
-            <a:spcAft>
-              <a:spcPct val="35000"/>
-            </a:spcAft>
-          </a:pPr>
-          <a:r>
-            <a:rPr lang="en-US" sz="4600" kern="1200" baseline="0" smtClean="0"/>
-            <a:t>Identity</a:t>
-          </a:r>
-          <a:endParaRPr lang="en-US" sz="4600" kern="1200"/>
-        </a:p>
-      </dsp:txBody>
-      <dsp:txXfrm>
-        <a:off x="4620275" y="1559"/>
-        <a:ext cx="3251844" cy="1951106"/>
-      </dsp:txXfrm>
-    </dsp:sp>
-    <dsp:sp modelId="{D923CAFD-827E-418A-A6B8-CAEE602F9457}">
-      <dsp:nvSpPr>
-        <dsp:cNvPr id="0" name=""/>
-        <dsp:cNvSpPr/>
-      </dsp:nvSpPr>
-      <dsp:spPr>
-        <a:xfrm>
-          <a:off x="1043245" y="2277851"/>
-          <a:ext cx="3251844" cy="1951106"/>
-        </a:xfrm>
-        <a:prstGeom prst="rect">
-          <a:avLst/>
-        </a:prstGeom>
-        <a:solidFill>
-          <a:schemeClr val="dk2">
-            <a:hueOff val="0"/>
-            <a:satOff val="0"/>
-            <a:lumOff val="0"/>
-            <a:alphaOff val="0"/>
-          </a:schemeClr>
-        </a:solidFill>
-        <a:ln w="12700" cap="flat" cmpd="sng" algn="ctr">
-          <a:solidFill>
-            <a:schemeClr val="lt2">
-              <a:hueOff val="0"/>
-              <a:satOff val="0"/>
-              <a:lumOff val="0"/>
-              <a:alphaOff val="0"/>
-            </a:schemeClr>
-          </a:solidFill>
-          <a:prstDash val="solid"/>
-          <a:miter lim="800000"/>
-        </a:ln>
-        <a:effectLst/>
-      </dsp:spPr>
-      <dsp:style>
-        <a:lnRef idx="2">
-          <a:scrgbClr r="0" g="0" b="0"/>
-        </a:lnRef>
-        <a:fillRef idx="1">
-          <a:scrgbClr r="0" g="0" b="0"/>
-        </a:fillRef>
-        <a:effectRef idx="0">
-          <a:scrgbClr r="0" g="0" b="0"/>
-        </a:effectRef>
-        <a:fontRef idx="minor">
-          <a:schemeClr val="lt1"/>
-        </a:fontRef>
-      </dsp:style>
-      <dsp:txBody>
-        <a:bodyPr spcFirstLastPara="0" vert="horz" wrap="square" lIns="175260" tIns="175260" rIns="175260" bIns="175260" numCol="1" spcCol="1270" anchor="ctr" anchorCtr="0">
-          <a:noAutofit/>
-        </a:bodyPr>
-        <a:lstStyle/>
-        <a:p>
-          <a:pPr lvl="0" algn="ctr" defTabSz="2044700" rtl="0">
-            <a:lnSpc>
-              <a:spcPct val="90000"/>
-            </a:lnSpc>
-            <a:spcBef>
-              <a:spcPct val="0"/>
-            </a:spcBef>
-            <a:spcAft>
-              <a:spcPct val="35000"/>
-            </a:spcAft>
-          </a:pPr>
-          <a:r>
-            <a:rPr lang="en-US" sz="4600" kern="1200" baseline="0" smtClean="0"/>
-            <a:t>Scaffolding</a:t>
-          </a:r>
-          <a:endParaRPr lang="en-US" sz="4600" kern="1200"/>
-        </a:p>
-      </dsp:txBody>
-      <dsp:txXfrm>
-        <a:off x="1043245" y="2277851"/>
-        <a:ext cx="3251844" cy="1951106"/>
-      </dsp:txXfrm>
-    </dsp:sp>
-    <dsp:sp modelId="{B290052F-5007-46EA-AECC-55B61C6D33E9}">
-      <dsp:nvSpPr>
-        <dsp:cNvPr id="0" name=""/>
-        <dsp:cNvSpPr/>
-      </dsp:nvSpPr>
-      <dsp:spPr>
-        <a:xfrm>
-          <a:off x="4620275" y="2277851"/>
-          <a:ext cx="3251844" cy="1951106"/>
-        </a:xfrm>
-        <a:prstGeom prst="rect">
-          <a:avLst/>
-        </a:prstGeom>
-        <a:solidFill>
-          <a:schemeClr val="dk2">
-            <a:hueOff val="0"/>
-            <a:satOff val="0"/>
-            <a:lumOff val="0"/>
-            <a:alphaOff val="0"/>
-          </a:schemeClr>
-        </a:solidFill>
-        <a:ln w="12700" cap="flat" cmpd="sng" algn="ctr">
-          <a:solidFill>
-            <a:schemeClr val="lt2">
-              <a:hueOff val="0"/>
-              <a:satOff val="0"/>
-              <a:lumOff val="0"/>
-              <a:alphaOff val="0"/>
-            </a:schemeClr>
-          </a:solidFill>
-          <a:prstDash val="solid"/>
-          <a:miter lim="800000"/>
-        </a:ln>
-        <a:effectLst/>
-      </dsp:spPr>
-      <dsp:style>
-        <a:lnRef idx="2">
-          <a:scrgbClr r="0" g="0" b="0"/>
-        </a:lnRef>
-        <a:fillRef idx="1">
-          <a:scrgbClr r="0" g="0" b="0"/>
-        </a:fillRef>
-        <a:effectRef idx="0">
-          <a:scrgbClr r="0" g="0" b="0"/>
-        </a:effectRef>
-        <a:fontRef idx="minor">
-          <a:schemeClr val="lt1"/>
-        </a:fontRef>
-      </dsp:style>
-      <dsp:txBody>
-        <a:bodyPr spcFirstLastPara="0" vert="horz" wrap="square" lIns="175260" tIns="175260" rIns="175260" bIns="175260" numCol="1" spcCol="1270" anchor="ctr" anchorCtr="0">
-          <a:noAutofit/>
-        </a:bodyPr>
-        <a:lstStyle/>
-        <a:p>
-          <a:pPr lvl="0" algn="ctr" defTabSz="2044700" rtl="0">
-            <a:lnSpc>
-              <a:spcPct val="90000"/>
-            </a:lnSpc>
-            <a:spcBef>
-              <a:spcPct val="0"/>
-            </a:spcBef>
-            <a:spcAft>
-              <a:spcPct val="35000"/>
-            </a:spcAft>
-          </a:pPr>
-          <a:r>
-            <a:rPr lang="en-US" sz="4600" kern="1200" baseline="0" smtClean="0"/>
-            <a:t>Owin</a:t>
-          </a:r>
-          <a:endParaRPr lang="en-US" sz="4600" kern="1200"/>
-        </a:p>
-      </dsp:txBody>
-      <dsp:txXfrm>
-        <a:off x="4620275" y="2277851"/>
-        <a:ext cx="3251844" cy="1951106"/>
-      </dsp:txXfrm>
-    </dsp:sp>
   </dsp:spTree>
 </dsp:drawing>
 </file>
@@ -6849,318 +6540,6 @@
       <dsp:cNvGrpSpPr/>
     </dsp:nvGrpSpPr>
     <dsp:grpSpPr/>
-    <dsp:sp modelId="{EEC31F3F-5BD5-4E9E-A641-45E67C1E5B0B}">
-      <dsp:nvSpPr>
-        <dsp:cNvPr id="0" name=""/>
-        <dsp:cNvSpPr/>
-      </dsp:nvSpPr>
-      <dsp:spPr>
-        <a:xfrm>
-          <a:off x="144174" y="1710"/>
-          <a:ext cx="3557941" cy="2134764"/>
-        </a:xfrm>
-        <a:prstGeom prst="rect">
-          <a:avLst/>
-        </a:prstGeom>
-        <a:solidFill>
-          <a:schemeClr val="dk2">
-            <a:hueOff val="0"/>
-            <a:satOff val="0"/>
-            <a:lumOff val="0"/>
-            <a:alphaOff val="0"/>
-          </a:schemeClr>
-        </a:solidFill>
-        <a:ln w="12700" cap="flat" cmpd="sng" algn="ctr">
-          <a:solidFill>
-            <a:schemeClr val="lt2">
-              <a:hueOff val="0"/>
-              <a:satOff val="0"/>
-              <a:lumOff val="0"/>
-              <a:alphaOff val="0"/>
-            </a:schemeClr>
-          </a:solidFill>
-          <a:prstDash val="solid"/>
-          <a:miter lim="800000"/>
-        </a:ln>
-        <a:effectLst/>
-      </dsp:spPr>
-      <dsp:style>
-        <a:lnRef idx="2">
-          <a:scrgbClr r="0" g="0" b="0"/>
-        </a:lnRef>
-        <a:fillRef idx="1">
-          <a:scrgbClr r="0" g="0" b="0"/>
-        </a:fillRef>
-        <a:effectRef idx="0">
-          <a:scrgbClr r="0" g="0" b="0"/>
-        </a:effectRef>
-        <a:fontRef idx="minor">
-          <a:schemeClr val="lt1"/>
-        </a:fontRef>
-      </dsp:style>
-      <dsp:txBody>
-        <a:bodyPr spcFirstLastPara="0" vert="horz" wrap="square" lIns="213360" tIns="213360" rIns="213360" bIns="213360" numCol="1" spcCol="1270" anchor="ctr" anchorCtr="0">
-          <a:noAutofit/>
-        </a:bodyPr>
-        <a:lstStyle/>
-        <a:p>
-          <a:pPr lvl="0" algn="ctr" defTabSz="2489200" rtl="0">
-            <a:lnSpc>
-              <a:spcPct val="90000"/>
-            </a:lnSpc>
-            <a:spcBef>
-              <a:spcPct val="0"/>
-            </a:spcBef>
-            <a:spcAft>
-              <a:spcPct val="35000"/>
-            </a:spcAft>
-          </a:pPr>
-          <a:r>
-            <a:rPr lang="en-US" sz="5600" kern="1200" baseline="0" smtClean="0"/>
-            <a:t>Browser Link</a:t>
-          </a:r>
-          <a:endParaRPr lang="en-US" sz="5600" kern="1200"/>
-        </a:p>
-      </dsp:txBody>
-      <dsp:txXfrm>
-        <a:off x="144174" y="1710"/>
-        <a:ext cx="3557941" cy="2134764"/>
-      </dsp:txXfrm>
-    </dsp:sp>
-    <dsp:sp modelId="{F5BAB179-7F80-4971-B336-BDDA85FE537D}">
-      <dsp:nvSpPr>
-        <dsp:cNvPr id="0" name=""/>
-        <dsp:cNvSpPr/>
-      </dsp:nvSpPr>
-      <dsp:spPr>
-        <a:xfrm>
-          <a:off x="4057910" y="1710"/>
-          <a:ext cx="3557941" cy="2134764"/>
-        </a:xfrm>
-        <a:prstGeom prst="rect">
-          <a:avLst/>
-        </a:prstGeom>
-        <a:solidFill>
-          <a:schemeClr val="dk2">
-            <a:hueOff val="0"/>
-            <a:satOff val="0"/>
-            <a:lumOff val="0"/>
-            <a:alphaOff val="0"/>
-          </a:schemeClr>
-        </a:solidFill>
-        <a:ln w="12700" cap="flat" cmpd="sng" algn="ctr">
-          <a:solidFill>
-            <a:schemeClr val="lt2">
-              <a:hueOff val="0"/>
-              <a:satOff val="0"/>
-              <a:lumOff val="0"/>
-              <a:alphaOff val="0"/>
-            </a:schemeClr>
-          </a:solidFill>
-          <a:prstDash val="solid"/>
-          <a:miter lim="800000"/>
-        </a:ln>
-        <a:effectLst/>
-      </dsp:spPr>
-      <dsp:style>
-        <a:lnRef idx="2">
-          <a:scrgbClr r="0" g="0" b="0"/>
-        </a:lnRef>
-        <a:fillRef idx="1">
-          <a:scrgbClr r="0" g="0" b="0"/>
-        </a:fillRef>
-        <a:effectRef idx="0">
-          <a:scrgbClr r="0" g="0" b="0"/>
-        </a:effectRef>
-        <a:fontRef idx="minor">
-          <a:schemeClr val="lt1"/>
-        </a:fontRef>
-      </dsp:style>
-      <dsp:txBody>
-        <a:bodyPr spcFirstLastPara="0" vert="horz" wrap="square" lIns="213360" tIns="213360" rIns="213360" bIns="213360" numCol="1" spcCol="1270" anchor="ctr" anchorCtr="0">
-          <a:noAutofit/>
-        </a:bodyPr>
-        <a:lstStyle/>
-        <a:p>
-          <a:pPr lvl="0" algn="ctr" defTabSz="2489200" rtl="0">
-            <a:lnSpc>
-              <a:spcPct val="90000"/>
-            </a:lnSpc>
-            <a:spcBef>
-              <a:spcPct val="0"/>
-            </a:spcBef>
-            <a:spcAft>
-              <a:spcPct val="35000"/>
-            </a:spcAft>
-          </a:pPr>
-          <a:r>
-            <a:rPr lang="en-US" sz="5600" kern="1200" baseline="0" smtClean="0"/>
-            <a:t>HTML Editor</a:t>
-          </a:r>
-          <a:endParaRPr lang="en-US" sz="5600" kern="1200"/>
-        </a:p>
-      </dsp:txBody>
-      <dsp:txXfrm>
-        <a:off x="4057910" y="1710"/>
-        <a:ext cx="3557941" cy="2134764"/>
-      </dsp:txXfrm>
-    </dsp:sp>
-    <dsp:sp modelId="{F27A7C40-7C1D-414B-8AEB-4CB7646ABB77}">
-      <dsp:nvSpPr>
-        <dsp:cNvPr id="0" name=""/>
-        <dsp:cNvSpPr/>
-      </dsp:nvSpPr>
-      <dsp:spPr>
-        <a:xfrm>
-          <a:off x="144174" y="2492270"/>
-          <a:ext cx="3557941" cy="2134764"/>
-        </a:xfrm>
-        <a:prstGeom prst="rect">
-          <a:avLst/>
-        </a:prstGeom>
-        <a:solidFill>
-          <a:schemeClr val="dk2">
-            <a:hueOff val="0"/>
-            <a:satOff val="0"/>
-            <a:lumOff val="0"/>
-            <a:alphaOff val="0"/>
-          </a:schemeClr>
-        </a:solidFill>
-        <a:ln w="12700" cap="flat" cmpd="sng" algn="ctr">
-          <a:solidFill>
-            <a:schemeClr val="lt2">
-              <a:hueOff val="0"/>
-              <a:satOff val="0"/>
-              <a:lumOff val="0"/>
-              <a:alphaOff val="0"/>
-            </a:schemeClr>
-          </a:solidFill>
-          <a:prstDash val="solid"/>
-          <a:miter lim="800000"/>
-        </a:ln>
-        <a:effectLst/>
-      </dsp:spPr>
-      <dsp:style>
-        <a:lnRef idx="2">
-          <a:scrgbClr r="0" g="0" b="0"/>
-        </a:lnRef>
-        <a:fillRef idx="1">
-          <a:scrgbClr r="0" g="0" b="0"/>
-        </a:fillRef>
-        <a:effectRef idx="0">
-          <a:scrgbClr r="0" g="0" b="0"/>
-        </a:effectRef>
-        <a:fontRef idx="minor">
-          <a:schemeClr val="lt1"/>
-        </a:fontRef>
-      </dsp:style>
-      <dsp:txBody>
-        <a:bodyPr spcFirstLastPara="0" vert="horz" wrap="square" lIns="213360" tIns="213360" rIns="213360" bIns="213360" numCol="1" spcCol="1270" anchor="ctr" anchorCtr="0">
-          <a:noAutofit/>
-        </a:bodyPr>
-        <a:lstStyle/>
-        <a:p>
-          <a:pPr lvl="0" algn="ctr" defTabSz="2489200" rtl="0">
-            <a:lnSpc>
-              <a:spcPct val="90000"/>
-            </a:lnSpc>
-            <a:spcBef>
-              <a:spcPct val="0"/>
-            </a:spcBef>
-            <a:spcAft>
-              <a:spcPct val="35000"/>
-            </a:spcAft>
-          </a:pPr>
-          <a:r>
-            <a:rPr lang="en-US" sz="5600" kern="1200" baseline="0" smtClean="0"/>
-            <a:t>Web Essentials</a:t>
-          </a:r>
-          <a:endParaRPr lang="en-US" sz="5600" kern="1200"/>
-        </a:p>
-      </dsp:txBody>
-      <dsp:txXfrm>
-        <a:off x="144174" y="2492270"/>
-        <a:ext cx="3557941" cy="2134764"/>
-      </dsp:txXfrm>
-    </dsp:sp>
-    <dsp:sp modelId="{8197187E-98B4-4ED7-BB2D-7023BDB15A12}">
-      <dsp:nvSpPr>
-        <dsp:cNvPr id="0" name=""/>
-        <dsp:cNvSpPr/>
-      </dsp:nvSpPr>
-      <dsp:spPr>
-        <a:xfrm>
-          <a:off x="4057910" y="2492270"/>
-          <a:ext cx="3557941" cy="2134764"/>
-        </a:xfrm>
-        <a:prstGeom prst="rect">
-          <a:avLst/>
-        </a:prstGeom>
-        <a:solidFill>
-          <a:schemeClr val="dk2">
-            <a:hueOff val="0"/>
-            <a:satOff val="0"/>
-            <a:lumOff val="0"/>
-            <a:alphaOff val="0"/>
-          </a:schemeClr>
-        </a:solidFill>
-        <a:ln w="12700" cap="flat" cmpd="sng" algn="ctr">
-          <a:solidFill>
-            <a:schemeClr val="lt2">
-              <a:hueOff val="0"/>
-              <a:satOff val="0"/>
-              <a:lumOff val="0"/>
-              <a:alphaOff val="0"/>
-            </a:schemeClr>
-          </a:solidFill>
-          <a:prstDash val="solid"/>
-          <a:miter lim="800000"/>
-        </a:ln>
-        <a:effectLst/>
-      </dsp:spPr>
-      <dsp:style>
-        <a:lnRef idx="2">
-          <a:scrgbClr r="0" g="0" b="0"/>
-        </a:lnRef>
-        <a:fillRef idx="1">
-          <a:scrgbClr r="0" g="0" b="0"/>
-        </a:fillRef>
-        <a:effectRef idx="0">
-          <a:scrgbClr r="0" g="0" b="0"/>
-        </a:effectRef>
-        <a:fontRef idx="minor">
-          <a:schemeClr val="lt1"/>
-        </a:fontRef>
-      </dsp:style>
-      <dsp:txBody>
-        <a:bodyPr spcFirstLastPara="0" vert="horz" wrap="square" lIns="213360" tIns="213360" rIns="213360" bIns="213360" numCol="1" spcCol="1270" anchor="ctr" anchorCtr="0">
-          <a:noAutofit/>
-        </a:bodyPr>
-        <a:lstStyle/>
-        <a:p>
-          <a:pPr lvl="0" algn="ctr" defTabSz="2489200" rtl="0">
-            <a:lnSpc>
-              <a:spcPct val="90000"/>
-            </a:lnSpc>
-            <a:spcBef>
-              <a:spcPct val="0"/>
-            </a:spcBef>
-            <a:spcAft>
-              <a:spcPct val="35000"/>
-            </a:spcAft>
-          </a:pPr>
-          <a:r>
-            <a:rPr lang="en-US" sz="5600" kern="1200" baseline="0" smtClean="0"/>
-            <a:t>Side Waffle</a:t>
-          </a:r>
-          <a:endParaRPr lang="en-US" sz="5600" kern="1200"/>
-        </a:p>
-      </dsp:txBody>
-      <dsp:txXfrm>
-        <a:off x="4057910" y="2492270"/>
-        <a:ext cx="3557941" cy="2134764"/>
-      </dsp:txXfrm>
-    </dsp:sp>
   </dsp:spTree>
 </dsp:drawing>
 </file>
@@ -13973,7 +13352,7 @@
           <a:p>
             <a:fld id="{0E990FE3-7537-4D15-A9F5-FDF1805FD5F8}" type="datetimeFigureOut">
               <a:rPr lang="en-US" smtClean="0"/>
-              <a:t>10/3/2014</a:t>
+              <a:t>6/5/2015</a:t>
             </a:fld>
             <a:endParaRPr lang="en-US"/>
           </a:p>
@@ -14435,45 +13814,7 @@
                 <a:ea typeface="Segoe UI" pitchFamily="34" charset="0"/>
                 <a:cs typeface="Segoe UI" pitchFamily="34" charset="0"/>
               </a:rPr>
-              <a:t>© 2012 Microsoft Corporation. All rights reserved. Microsoft, </a:t>
-            </a:r>
-            <a:r>
-              <a:rPr lang="en-US" sz="400" dirty="0" smtClean="0">
-                <a:gradFill>
-                  <a:gsLst>
-                    <a:gs pos="0">
-                      <a:prstClr val="black"/>
-                    </a:gs>
-                    <a:gs pos="100000">
-                      <a:prstClr val="black"/>
-                    </a:gs>
-                  </a:gsLst>
-                  <a:lin ang="5400000" scaled="0"/>
-                </a:gradFill>
-                <a:latin typeface="Segoe UI" pitchFamily="34" charset="0"/>
-                <a:ea typeface="Segoe UI" pitchFamily="34" charset="0"/>
-                <a:cs typeface="Segoe UI" pitchFamily="34" charset="0"/>
-              </a:rPr>
-              <a:t>Microsoft, </a:t>
-            </a:r>
-            <a:r>
-              <a:rPr lang="en-US" sz="400" dirty="0" smtClean="0">
-                <a:gradFill>
-                  <a:gsLst>
-                    <a:gs pos="0">
-                      <a:prstClr val="black"/>
-                    </a:gs>
-                    <a:gs pos="100000">
-                      <a:prstClr val="black"/>
-                    </a:gs>
-                  </a:gsLst>
-                  <a:lin ang="5400000" scaled="0"/>
-                </a:gradFill>
-                <a:latin typeface="Segoe UI" pitchFamily="34" charset="0"/>
-                <a:ea typeface="Segoe UI" pitchFamily="34" charset="0"/>
-                <a:cs typeface="Segoe UI" pitchFamily="34" charset="0"/>
-              </a:rPr>
-              <a:t>and other product names are or may be registered trademarks and/or trademarks in the U.S. and/or other countries.</a:t>
+              <a:t>© 2012 Microsoft Corporation. All rights reserved. Microsoft, Microsoft, and other product names are or may be registered trademarks and/or trademarks in the U.S. and/or other countries.</a:t>
             </a:r>
           </a:p>
           <a:p>
@@ -14517,7 +13858,7 @@
           <a:p>
             <a:fld id="{A9970F64-953B-405E-BC1E-CCCF6619DB06}" type="datetime1">
               <a:rPr lang="en-US" smtClean="0"/>
-              <a:t>10/3/2014</a:t>
+              <a:t>6/5/2015</a:t>
             </a:fld>
             <a:endParaRPr lang="en-US" dirty="0"/>
           </a:p>
@@ -14660,45 +14001,7 @@
                 <a:ea typeface="Segoe UI" pitchFamily="34" charset="0"/>
                 <a:cs typeface="Segoe UI" pitchFamily="34" charset="0"/>
               </a:rPr>
-              <a:t>© 2012 Microsoft Corporation. All rights reserved. Microsoft, </a:t>
-            </a:r>
-            <a:r>
-              <a:rPr lang="en-US" sz="400" dirty="0" smtClean="0">
-                <a:gradFill>
-                  <a:gsLst>
-                    <a:gs pos="0">
-                      <a:prstClr val="black"/>
-                    </a:gs>
-                    <a:gs pos="100000">
-                      <a:prstClr val="black"/>
-                    </a:gs>
-                  </a:gsLst>
-                  <a:lin ang="5400000" scaled="0"/>
-                </a:gradFill>
-                <a:latin typeface="Segoe UI" pitchFamily="34" charset="0"/>
-                <a:ea typeface="Segoe UI" pitchFamily="34" charset="0"/>
-                <a:cs typeface="Segoe UI" pitchFamily="34" charset="0"/>
-              </a:rPr>
-              <a:t>Microsoft, </a:t>
-            </a:r>
-            <a:r>
-              <a:rPr lang="en-US" sz="400" dirty="0" smtClean="0">
-                <a:gradFill>
-                  <a:gsLst>
-                    <a:gs pos="0">
-                      <a:prstClr val="black"/>
-                    </a:gs>
-                    <a:gs pos="100000">
-                      <a:prstClr val="black"/>
-                    </a:gs>
-                  </a:gsLst>
-                  <a:lin ang="5400000" scaled="0"/>
-                </a:gradFill>
-                <a:latin typeface="Segoe UI" pitchFamily="34" charset="0"/>
-                <a:ea typeface="Segoe UI" pitchFamily="34" charset="0"/>
-                <a:cs typeface="Segoe UI" pitchFamily="34" charset="0"/>
-              </a:rPr>
-              <a:t>and other product names are or may be registered trademarks and/or trademarks in the U.S. and/or other countries.</a:t>
+              <a:t>© 2012 Microsoft Corporation. All rights reserved. Microsoft, Microsoft, and other product names are or may be registered trademarks and/or trademarks in the U.S. and/or other countries.</a:t>
             </a:r>
           </a:p>
           <a:p>
@@ -14742,7 +14045,7 @@
           <a:p>
             <a:fld id="{042E64AC-1CE6-49D9-84F1-EA66C04C420D}" type="datetime1">
               <a:rPr lang="en-US" smtClean="0"/>
-              <a:t>10/3/2014</a:t>
+              <a:t>6/5/2015</a:t>
             </a:fld>
             <a:endParaRPr lang="en-US" dirty="0"/>
           </a:p>
@@ -14885,45 +14188,7 @@
                 <a:ea typeface="Segoe UI" pitchFamily="34" charset="0"/>
                 <a:cs typeface="Segoe UI" pitchFamily="34" charset="0"/>
               </a:rPr>
-              <a:t>© 2012 Microsoft Corporation. All rights reserved. Microsoft, </a:t>
-            </a:r>
-            <a:r>
-              <a:rPr lang="en-US" sz="400" dirty="0" smtClean="0">
-                <a:gradFill>
-                  <a:gsLst>
-                    <a:gs pos="0">
-                      <a:prstClr val="black"/>
-                    </a:gs>
-                    <a:gs pos="100000">
-                      <a:prstClr val="black"/>
-                    </a:gs>
-                  </a:gsLst>
-                  <a:lin ang="5400000" scaled="0"/>
-                </a:gradFill>
-                <a:latin typeface="Segoe UI" pitchFamily="34" charset="0"/>
-                <a:ea typeface="Segoe UI" pitchFamily="34" charset="0"/>
-                <a:cs typeface="Segoe UI" pitchFamily="34" charset="0"/>
-              </a:rPr>
-              <a:t>Microsoft, </a:t>
-            </a:r>
-            <a:r>
-              <a:rPr lang="en-US" sz="400" dirty="0" smtClean="0">
-                <a:gradFill>
-                  <a:gsLst>
-                    <a:gs pos="0">
-                      <a:prstClr val="black"/>
-                    </a:gs>
-                    <a:gs pos="100000">
-                      <a:prstClr val="black"/>
-                    </a:gs>
-                  </a:gsLst>
-                  <a:lin ang="5400000" scaled="0"/>
-                </a:gradFill>
-                <a:latin typeface="Segoe UI" pitchFamily="34" charset="0"/>
-                <a:ea typeface="Segoe UI" pitchFamily="34" charset="0"/>
-                <a:cs typeface="Segoe UI" pitchFamily="34" charset="0"/>
-              </a:rPr>
-              <a:t>and other product names are or may be registered trademarks and/or trademarks in the U.S. and/or other countries.</a:t>
+              <a:t>© 2012 Microsoft Corporation. All rights reserved. Microsoft, Microsoft, and other product names are or may be registered trademarks and/or trademarks in the U.S. and/or other countries.</a:t>
             </a:r>
           </a:p>
           <a:p>
@@ -14967,7 +14232,7 @@
           <a:p>
             <a:fld id="{E0B874F6-01F1-466C-A859-44A61649DE51}" type="datetime1">
               <a:rPr lang="en-US" smtClean="0"/>
-              <a:t>10/3/2014</a:t>
+              <a:t>6/5/2015</a:t>
             </a:fld>
             <a:endParaRPr lang="en-US" dirty="0"/>
           </a:p>
@@ -15110,45 +14375,7 @@
                 <a:ea typeface="Segoe UI" pitchFamily="34" charset="0"/>
                 <a:cs typeface="Segoe UI" pitchFamily="34" charset="0"/>
               </a:rPr>
-              <a:t>© 2012 Microsoft Corporation. All rights reserved. Microsoft, </a:t>
-            </a:r>
-            <a:r>
-              <a:rPr lang="en-US" sz="400" dirty="0" smtClean="0">
-                <a:gradFill>
-                  <a:gsLst>
-                    <a:gs pos="0">
-                      <a:prstClr val="black"/>
-                    </a:gs>
-                    <a:gs pos="100000">
-                      <a:prstClr val="black"/>
-                    </a:gs>
-                  </a:gsLst>
-                  <a:lin ang="5400000" scaled="0"/>
-                </a:gradFill>
-                <a:latin typeface="Segoe UI" pitchFamily="34" charset="0"/>
-                <a:ea typeface="Segoe UI" pitchFamily="34" charset="0"/>
-                <a:cs typeface="Segoe UI" pitchFamily="34" charset="0"/>
-              </a:rPr>
-              <a:t>Microsoft, </a:t>
-            </a:r>
-            <a:r>
-              <a:rPr lang="en-US" sz="400" dirty="0" smtClean="0">
-                <a:gradFill>
-                  <a:gsLst>
-                    <a:gs pos="0">
-                      <a:prstClr val="black"/>
-                    </a:gs>
-                    <a:gs pos="100000">
-                      <a:prstClr val="black"/>
-                    </a:gs>
-                  </a:gsLst>
-                  <a:lin ang="5400000" scaled="0"/>
-                </a:gradFill>
-                <a:latin typeface="Segoe UI" pitchFamily="34" charset="0"/>
-                <a:ea typeface="Segoe UI" pitchFamily="34" charset="0"/>
-                <a:cs typeface="Segoe UI" pitchFamily="34" charset="0"/>
-              </a:rPr>
-              <a:t>and other product names are or may be registered trademarks and/or trademarks in the U.S. and/or other countries.</a:t>
+              <a:t>© 2012 Microsoft Corporation. All rights reserved. Microsoft, Microsoft, and other product names are or may be registered trademarks and/or trademarks in the U.S. and/or other countries.</a:t>
             </a:r>
           </a:p>
           <a:p>
@@ -15192,7 +14419,7 @@
           <a:p>
             <a:fld id="{3981007E-56B8-4E4D-80F8-EC068B80625A}" type="datetime1">
               <a:rPr lang="en-US" smtClean="0"/>
-              <a:t>10/3/2014</a:t>
+              <a:t>6/5/2015</a:t>
             </a:fld>
             <a:endParaRPr lang="en-US" dirty="0"/>
           </a:p>
@@ -15343,45 +14570,7 @@
                 <a:ea typeface="Segoe UI" pitchFamily="34" charset="0"/>
                 <a:cs typeface="Segoe UI" pitchFamily="34" charset="0"/>
               </a:rPr>
-              <a:t>© 2012 Microsoft Corporation. All rights reserved. Microsoft, </a:t>
-            </a:r>
-            <a:r>
-              <a:rPr lang="en-US" sz="400" dirty="0" smtClean="0">
-                <a:gradFill>
-                  <a:gsLst>
-                    <a:gs pos="0">
-                      <a:prstClr val="black"/>
-                    </a:gs>
-                    <a:gs pos="100000">
-                      <a:prstClr val="black"/>
-                    </a:gs>
-                  </a:gsLst>
-                  <a:lin ang="5400000" scaled="0"/>
-                </a:gradFill>
-                <a:latin typeface="Segoe UI" pitchFamily="34" charset="0"/>
-                <a:ea typeface="Segoe UI" pitchFamily="34" charset="0"/>
-                <a:cs typeface="Segoe UI" pitchFamily="34" charset="0"/>
-              </a:rPr>
-              <a:t>Microsoft, </a:t>
-            </a:r>
-            <a:r>
-              <a:rPr lang="en-US" sz="400" dirty="0" smtClean="0">
-                <a:gradFill>
-                  <a:gsLst>
-                    <a:gs pos="0">
-                      <a:prstClr val="black"/>
-                    </a:gs>
-                    <a:gs pos="100000">
-                      <a:prstClr val="black"/>
-                    </a:gs>
-                  </a:gsLst>
-                  <a:lin ang="5400000" scaled="0"/>
-                </a:gradFill>
-                <a:latin typeface="Segoe UI" pitchFamily="34" charset="0"/>
-                <a:ea typeface="Segoe UI" pitchFamily="34" charset="0"/>
-                <a:cs typeface="Segoe UI" pitchFamily="34" charset="0"/>
-              </a:rPr>
-              <a:t>and other product names are or may be registered trademarks and/or trademarks in the U.S. and/or other countries.</a:t>
+              <a:t>© 2012 Microsoft Corporation. All rights reserved. Microsoft, Microsoft, and other product names are or may be registered trademarks and/or trademarks in the U.S. and/or other countries.</a:t>
             </a:r>
           </a:p>
           <a:p>
@@ -15425,7 +14614,7 @@
           <a:p>
             <a:fld id="{76D04415-B59E-4C7B-B9F3-190CA9C2CD82}" type="datetime1">
               <a:rPr lang="en-US" smtClean="0"/>
-              <a:t>10/3/2014</a:t>
+              <a:t>6/5/2015</a:t>
             </a:fld>
             <a:endParaRPr lang="en-US" dirty="0"/>
           </a:p>
@@ -15568,45 +14757,7 @@
                 <a:ea typeface="Segoe UI" pitchFamily="34" charset="0"/>
                 <a:cs typeface="Segoe UI" pitchFamily="34" charset="0"/>
               </a:rPr>
-              <a:t>© 2012 Microsoft Corporation. All rights reserved. Microsoft, </a:t>
-            </a:r>
-            <a:r>
-              <a:rPr lang="en-US" sz="400" dirty="0" smtClean="0">
-                <a:gradFill>
-                  <a:gsLst>
-                    <a:gs pos="0">
-                      <a:prstClr val="black"/>
-                    </a:gs>
-                    <a:gs pos="100000">
-                      <a:prstClr val="black"/>
-                    </a:gs>
-                  </a:gsLst>
-                  <a:lin ang="5400000" scaled="0"/>
-                </a:gradFill>
-                <a:latin typeface="Segoe UI" pitchFamily="34" charset="0"/>
-                <a:ea typeface="Segoe UI" pitchFamily="34" charset="0"/>
-                <a:cs typeface="Segoe UI" pitchFamily="34" charset="0"/>
-              </a:rPr>
-              <a:t>Microsoft, </a:t>
-            </a:r>
-            <a:r>
-              <a:rPr lang="en-US" sz="400" dirty="0" smtClean="0">
-                <a:gradFill>
-                  <a:gsLst>
-                    <a:gs pos="0">
-                      <a:prstClr val="black"/>
-                    </a:gs>
-                    <a:gs pos="100000">
-                      <a:prstClr val="black"/>
-                    </a:gs>
-                  </a:gsLst>
-                  <a:lin ang="5400000" scaled="0"/>
-                </a:gradFill>
-                <a:latin typeface="Segoe UI" pitchFamily="34" charset="0"/>
-                <a:ea typeface="Segoe UI" pitchFamily="34" charset="0"/>
-                <a:cs typeface="Segoe UI" pitchFamily="34" charset="0"/>
-              </a:rPr>
-              <a:t>and other product names are or may be registered trademarks and/or trademarks in the U.S. and/or other countries.</a:t>
+              <a:t>© 2012 Microsoft Corporation. All rights reserved. Microsoft, Microsoft, and other product names are or may be registered trademarks and/or trademarks in the U.S. and/or other countries.</a:t>
             </a:r>
           </a:p>
           <a:p>
@@ -15650,7 +14801,7 @@
           <a:p>
             <a:fld id="{042E64AC-1CE6-49D9-84F1-EA66C04C420D}" type="datetime1">
               <a:rPr lang="en-US" smtClean="0"/>
-              <a:t>10/3/2014</a:t>
+              <a:t>6/5/2015</a:t>
             </a:fld>
             <a:endParaRPr lang="en-US" dirty="0"/>
           </a:p>
@@ -15793,45 +14944,7 @@
                 <a:ea typeface="Segoe UI" pitchFamily="34" charset="0"/>
                 <a:cs typeface="Segoe UI" pitchFamily="34" charset="0"/>
               </a:rPr>
-              <a:t>© 2012 Microsoft Corporation. All rights reserved. Microsoft, </a:t>
-            </a:r>
-            <a:r>
-              <a:rPr lang="en-US" sz="400" dirty="0" smtClean="0">
-                <a:gradFill>
-                  <a:gsLst>
-                    <a:gs pos="0">
-                      <a:prstClr val="black"/>
-                    </a:gs>
-                    <a:gs pos="100000">
-                      <a:prstClr val="black"/>
-                    </a:gs>
-                  </a:gsLst>
-                  <a:lin ang="5400000" scaled="0"/>
-                </a:gradFill>
-                <a:latin typeface="Segoe UI" pitchFamily="34" charset="0"/>
-                <a:ea typeface="Segoe UI" pitchFamily="34" charset="0"/>
-                <a:cs typeface="Segoe UI" pitchFamily="34" charset="0"/>
-              </a:rPr>
-              <a:t>Microsoft, </a:t>
-            </a:r>
-            <a:r>
-              <a:rPr lang="en-US" sz="400" dirty="0" smtClean="0">
-                <a:gradFill>
-                  <a:gsLst>
-                    <a:gs pos="0">
-                      <a:prstClr val="black"/>
-                    </a:gs>
-                    <a:gs pos="100000">
-                      <a:prstClr val="black"/>
-                    </a:gs>
-                  </a:gsLst>
-                  <a:lin ang="5400000" scaled="0"/>
-                </a:gradFill>
-                <a:latin typeface="Segoe UI" pitchFamily="34" charset="0"/>
-                <a:ea typeface="Segoe UI" pitchFamily="34" charset="0"/>
-                <a:cs typeface="Segoe UI" pitchFamily="34" charset="0"/>
-              </a:rPr>
-              <a:t>and other product names are or may be registered trademarks and/or trademarks in the U.S. and/or other countries.</a:t>
+              <a:t>© 2012 Microsoft Corporation. All rights reserved. Microsoft, Microsoft, and other product names are or may be registered trademarks and/or trademarks in the U.S. and/or other countries.</a:t>
             </a:r>
           </a:p>
           <a:p>
@@ -15875,7 +14988,7 @@
           <a:p>
             <a:fld id="{6C75721E-4881-43E6-8008-26B47D686F64}" type="datetime1">
               <a:rPr lang="en-US" smtClean="0"/>
-              <a:t>10/3/2014</a:t>
+              <a:t>6/5/2015</a:t>
             </a:fld>
             <a:endParaRPr lang="en-US" dirty="0"/>
           </a:p>
@@ -16018,45 +15131,7 @@
                 <a:ea typeface="Segoe UI" pitchFamily="34" charset="0"/>
                 <a:cs typeface="Segoe UI" pitchFamily="34" charset="0"/>
               </a:rPr>
-              <a:t>© 2012 Microsoft Corporation. All rights reserved. Microsoft, </a:t>
-            </a:r>
-            <a:r>
-              <a:rPr lang="en-US" sz="400" dirty="0" smtClean="0">
-                <a:gradFill>
-                  <a:gsLst>
-                    <a:gs pos="0">
-                      <a:prstClr val="black"/>
-                    </a:gs>
-                    <a:gs pos="100000">
-                      <a:prstClr val="black"/>
-                    </a:gs>
-                  </a:gsLst>
-                  <a:lin ang="5400000" scaled="0"/>
-                </a:gradFill>
-                <a:latin typeface="Segoe UI" pitchFamily="34" charset="0"/>
-                <a:ea typeface="Segoe UI" pitchFamily="34" charset="0"/>
-                <a:cs typeface="Segoe UI" pitchFamily="34" charset="0"/>
-              </a:rPr>
-              <a:t>Microsoft, </a:t>
-            </a:r>
-            <a:r>
-              <a:rPr lang="en-US" sz="400" dirty="0" smtClean="0">
-                <a:gradFill>
-                  <a:gsLst>
-                    <a:gs pos="0">
-                      <a:prstClr val="black"/>
-                    </a:gs>
-                    <a:gs pos="100000">
-                      <a:prstClr val="black"/>
-                    </a:gs>
-                  </a:gsLst>
-                  <a:lin ang="5400000" scaled="0"/>
-                </a:gradFill>
-                <a:latin typeface="Segoe UI" pitchFamily="34" charset="0"/>
-                <a:ea typeface="Segoe UI" pitchFamily="34" charset="0"/>
-                <a:cs typeface="Segoe UI" pitchFamily="34" charset="0"/>
-              </a:rPr>
-              <a:t>and other product names are or may be registered trademarks and/or trademarks in the U.S. and/or other countries.</a:t>
+              <a:t>© 2012 Microsoft Corporation. All rights reserved. Microsoft, Microsoft, and other product names are or may be registered trademarks and/or trademarks in the U.S. and/or other countries.</a:t>
             </a:r>
           </a:p>
           <a:p>
@@ -16100,7 +15175,7 @@
           <a:p>
             <a:fld id="{CC021316-1984-451C-9142-E4090A20721E}" type="datetime1">
               <a:rPr lang="en-US" smtClean="0"/>
-              <a:t>10/3/2014</a:t>
+              <a:t>6/5/2015</a:t>
             </a:fld>
             <a:endParaRPr lang="en-US" dirty="0"/>
           </a:p>
@@ -16243,45 +15318,7 @@
                 <a:ea typeface="Segoe UI" pitchFamily="34" charset="0"/>
                 <a:cs typeface="Segoe UI" pitchFamily="34" charset="0"/>
               </a:rPr>
-              <a:t>© 2012 Microsoft Corporation. All rights reserved. Microsoft, </a:t>
-            </a:r>
-            <a:r>
-              <a:rPr lang="en-US" sz="400" dirty="0" smtClean="0">
-                <a:gradFill>
-                  <a:gsLst>
-                    <a:gs pos="0">
-                      <a:prstClr val="black"/>
-                    </a:gs>
-                    <a:gs pos="100000">
-                      <a:prstClr val="black"/>
-                    </a:gs>
-                  </a:gsLst>
-                  <a:lin ang="5400000" scaled="0"/>
-                </a:gradFill>
-                <a:latin typeface="Segoe UI" pitchFamily="34" charset="0"/>
-                <a:ea typeface="Segoe UI" pitchFamily="34" charset="0"/>
-                <a:cs typeface="Segoe UI" pitchFamily="34" charset="0"/>
-              </a:rPr>
-              <a:t>Microsoft, </a:t>
-            </a:r>
-            <a:r>
-              <a:rPr lang="en-US" sz="400" dirty="0" smtClean="0">
-                <a:gradFill>
-                  <a:gsLst>
-                    <a:gs pos="0">
-                      <a:prstClr val="black"/>
-                    </a:gs>
-                    <a:gs pos="100000">
-                      <a:prstClr val="black"/>
-                    </a:gs>
-                  </a:gsLst>
-                  <a:lin ang="5400000" scaled="0"/>
-                </a:gradFill>
-                <a:latin typeface="Segoe UI" pitchFamily="34" charset="0"/>
-                <a:ea typeface="Segoe UI" pitchFamily="34" charset="0"/>
-                <a:cs typeface="Segoe UI" pitchFamily="34" charset="0"/>
-              </a:rPr>
-              <a:t>and other product names are or may be registered trademarks and/or trademarks in the U.S. and/or other countries.</a:t>
+              <a:t>© 2012 Microsoft Corporation. All rights reserved. Microsoft, Microsoft, and other product names are or may be registered trademarks and/or trademarks in the U.S. and/or other countries.</a:t>
             </a:r>
           </a:p>
           <a:p>
@@ -16325,7 +15362,7 @@
           <a:p>
             <a:fld id="{6C75721E-4881-43E6-8008-26B47D686F64}" type="datetime1">
               <a:rPr lang="en-US" smtClean="0"/>
-              <a:t>10/3/2014</a:t>
+              <a:t>6/5/2015</a:t>
             </a:fld>
             <a:endParaRPr lang="en-US" dirty="0"/>
           </a:p>
@@ -16468,45 +15505,7 @@
                 <a:ea typeface="Segoe UI" pitchFamily="34" charset="0"/>
                 <a:cs typeface="Segoe UI" pitchFamily="34" charset="0"/>
               </a:rPr>
-              <a:t>© 2012 Microsoft Corporation. All rights reserved. Microsoft, </a:t>
-            </a:r>
-            <a:r>
-              <a:rPr lang="en-US" sz="400" dirty="0" smtClean="0">
-                <a:gradFill>
-                  <a:gsLst>
-                    <a:gs pos="0">
-                      <a:prstClr val="black"/>
-                    </a:gs>
-                    <a:gs pos="100000">
-                      <a:prstClr val="black"/>
-                    </a:gs>
-                  </a:gsLst>
-                  <a:lin ang="5400000" scaled="0"/>
-                </a:gradFill>
-                <a:latin typeface="Segoe UI" pitchFamily="34" charset="0"/>
-                <a:ea typeface="Segoe UI" pitchFamily="34" charset="0"/>
-                <a:cs typeface="Segoe UI" pitchFamily="34" charset="0"/>
-              </a:rPr>
-              <a:t>Microsoft, </a:t>
-            </a:r>
-            <a:r>
-              <a:rPr lang="en-US" sz="400" dirty="0" smtClean="0">
-                <a:gradFill>
-                  <a:gsLst>
-                    <a:gs pos="0">
-                      <a:prstClr val="black"/>
-                    </a:gs>
-                    <a:gs pos="100000">
-                      <a:prstClr val="black"/>
-                    </a:gs>
-                  </a:gsLst>
-                  <a:lin ang="5400000" scaled="0"/>
-                </a:gradFill>
-                <a:latin typeface="Segoe UI" pitchFamily="34" charset="0"/>
-                <a:ea typeface="Segoe UI" pitchFamily="34" charset="0"/>
-                <a:cs typeface="Segoe UI" pitchFamily="34" charset="0"/>
-              </a:rPr>
-              <a:t>and other product names are or may be registered trademarks and/or trademarks in the U.S. and/or other countries.</a:t>
+              <a:t>© 2012 Microsoft Corporation. All rights reserved. Microsoft, Microsoft, and other product names are or may be registered trademarks and/or trademarks in the U.S. and/or other countries.</a:t>
             </a:r>
           </a:p>
           <a:p>
@@ -16550,7 +15549,7 @@
           <a:p>
             <a:fld id="{3981007E-56B8-4E4D-80F8-EC068B80625A}" type="datetime1">
               <a:rPr lang="en-US" smtClean="0"/>
-              <a:t>10/3/2014</a:t>
+              <a:t>6/5/2015</a:t>
             </a:fld>
             <a:endParaRPr lang="en-US" dirty="0"/>
           </a:p>
@@ -16693,45 +15692,7 @@
                 <a:ea typeface="Segoe UI" pitchFamily="34" charset="0"/>
                 <a:cs typeface="Segoe UI" pitchFamily="34" charset="0"/>
               </a:rPr>
-              <a:t>© 2012 Microsoft Corporation. All rights reserved. Microsoft, </a:t>
-            </a:r>
-            <a:r>
-              <a:rPr lang="en-US" sz="400" dirty="0" smtClean="0">
-                <a:gradFill>
-                  <a:gsLst>
-                    <a:gs pos="0">
-                      <a:prstClr val="black"/>
-                    </a:gs>
-                    <a:gs pos="100000">
-                      <a:prstClr val="black"/>
-                    </a:gs>
-                  </a:gsLst>
-                  <a:lin ang="5400000" scaled="0"/>
-                </a:gradFill>
-                <a:latin typeface="Segoe UI" pitchFamily="34" charset="0"/>
-                <a:ea typeface="Segoe UI" pitchFamily="34" charset="0"/>
-                <a:cs typeface="Segoe UI" pitchFamily="34" charset="0"/>
-              </a:rPr>
-              <a:t>Microsoft, </a:t>
-            </a:r>
-            <a:r>
-              <a:rPr lang="en-US" sz="400" dirty="0" smtClean="0">
-                <a:gradFill>
-                  <a:gsLst>
-                    <a:gs pos="0">
-                      <a:prstClr val="black"/>
-                    </a:gs>
-                    <a:gs pos="100000">
-                      <a:prstClr val="black"/>
-                    </a:gs>
-                  </a:gsLst>
-                  <a:lin ang="5400000" scaled="0"/>
-                </a:gradFill>
-                <a:latin typeface="Segoe UI" pitchFamily="34" charset="0"/>
-                <a:ea typeface="Segoe UI" pitchFamily="34" charset="0"/>
-                <a:cs typeface="Segoe UI" pitchFamily="34" charset="0"/>
-              </a:rPr>
-              <a:t>and other product names are or may be registered trademarks and/or trademarks in the U.S. and/or other countries.</a:t>
+              <a:t>© 2012 Microsoft Corporation. All rights reserved. Microsoft, Microsoft, and other product names are or may be registered trademarks and/or trademarks in the U.S. and/or other countries.</a:t>
             </a:r>
           </a:p>
           <a:p>
@@ -16775,7 +15736,7 @@
           <a:p>
             <a:fld id="{3981007E-56B8-4E4D-80F8-EC068B80625A}" type="datetime1">
               <a:rPr lang="en-US" smtClean="0"/>
-              <a:t>10/3/2014</a:t>
+              <a:t>6/5/2015</a:t>
             </a:fld>
             <a:endParaRPr lang="en-US" dirty="0"/>
           </a:p>
@@ -16918,45 +15879,7 @@
                 <a:ea typeface="Segoe UI" pitchFamily="34" charset="0"/>
                 <a:cs typeface="Segoe UI" pitchFamily="34" charset="0"/>
               </a:rPr>
-              <a:t>© 2012 Microsoft Corporation. All rights reserved. Microsoft, </a:t>
-            </a:r>
-            <a:r>
-              <a:rPr lang="en-US" sz="400" dirty="0" smtClean="0">
-                <a:gradFill>
-                  <a:gsLst>
-                    <a:gs pos="0">
-                      <a:prstClr val="black"/>
-                    </a:gs>
-                    <a:gs pos="100000">
-                      <a:prstClr val="black"/>
-                    </a:gs>
-                  </a:gsLst>
-                  <a:lin ang="5400000" scaled="0"/>
-                </a:gradFill>
-                <a:latin typeface="Segoe UI" pitchFamily="34" charset="0"/>
-                <a:ea typeface="Segoe UI" pitchFamily="34" charset="0"/>
-                <a:cs typeface="Segoe UI" pitchFamily="34" charset="0"/>
-              </a:rPr>
-              <a:t>Microsoft, </a:t>
-            </a:r>
-            <a:r>
-              <a:rPr lang="en-US" sz="400" dirty="0" smtClean="0">
-                <a:gradFill>
-                  <a:gsLst>
-                    <a:gs pos="0">
-                      <a:prstClr val="black"/>
-                    </a:gs>
-                    <a:gs pos="100000">
-                      <a:prstClr val="black"/>
-                    </a:gs>
-                  </a:gsLst>
-                  <a:lin ang="5400000" scaled="0"/>
-                </a:gradFill>
-                <a:latin typeface="Segoe UI" pitchFamily="34" charset="0"/>
-                <a:ea typeface="Segoe UI" pitchFamily="34" charset="0"/>
-                <a:cs typeface="Segoe UI" pitchFamily="34" charset="0"/>
-              </a:rPr>
-              <a:t>and other product names are or may be registered trademarks and/or trademarks in the U.S. and/or other countries.</a:t>
+              <a:t>© 2012 Microsoft Corporation. All rights reserved. Microsoft, Microsoft, and other product names are or may be registered trademarks and/or trademarks in the U.S. and/or other countries.</a:t>
             </a:r>
           </a:p>
           <a:p>
@@ -17000,7 +15923,7 @@
           <a:p>
             <a:fld id="{3981007E-56B8-4E4D-80F8-EC068B80625A}" type="datetime1">
               <a:rPr lang="en-US" smtClean="0"/>
-              <a:t>10/3/2014</a:t>
+              <a:t>6/5/2015</a:t>
             </a:fld>
             <a:endParaRPr lang="en-US" dirty="0"/>
           </a:p>
@@ -17313,45 +16236,7 @@
                 <a:ea typeface="Segoe UI" pitchFamily="34" charset="0"/>
                 <a:cs typeface="Segoe UI" pitchFamily="34" charset="0"/>
               </a:rPr>
-              <a:t>© 2012 Microsoft Corporation. All rights reserved. Microsoft, </a:t>
-            </a:r>
-            <a:r>
-              <a:rPr lang="en-US" sz="400" dirty="0" smtClean="0">
-                <a:gradFill>
-                  <a:gsLst>
-                    <a:gs pos="0">
-                      <a:prstClr val="black"/>
-                    </a:gs>
-                    <a:gs pos="100000">
-                      <a:prstClr val="black"/>
-                    </a:gs>
-                  </a:gsLst>
-                  <a:lin ang="5400000" scaled="0"/>
-                </a:gradFill>
-                <a:latin typeface="Segoe UI" pitchFamily="34" charset="0"/>
-                <a:ea typeface="Segoe UI" pitchFamily="34" charset="0"/>
-                <a:cs typeface="Segoe UI" pitchFamily="34" charset="0"/>
-              </a:rPr>
-              <a:t>Microsoft, </a:t>
-            </a:r>
-            <a:r>
-              <a:rPr lang="en-US" sz="400" dirty="0" smtClean="0">
-                <a:gradFill>
-                  <a:gsLst>
-                    <a:gs pos="0">
-                      <a:prstClr val="black"/>
-                    </a:gs>
-                    <a:gs pos="100000">
-                      <a:prstClr val="black"/>
-                    </a:gs>
-                  </a:gsLst>
-                  <a:lin ang="5400000" scaled="0"/>
-                </a:gradFill>
-                <a:latin typeface="Segoe UI" pitchFamily="34" charset="0"/>
-                <a:ea typeface="Segoe UI" pitchFamily="34" charset="0"/>
-                <a:cs typeface="Segoe UI" pitchFamily="34" charset="0"/>
-              </a:rPr>
-              <a:t>and other product names are or may be registered trademarks and/or trademarks in the U.S. and/or other countries.</a:t>
+              <a:t>© 2012 Microsoft Corporation. All rights reserved. Microsoft, Microsoft, and other product names are or may be registered trademarks and/or trademarks in the U.S. and/or other countries.</a:t>
             </a:r>
           </a:p>
           <a:p>
@@ -17395,7 +16280,7 @@
           <a:p>
             <a:fld id="{684D7E90-17F8-419C-9863-373D55ADD8E6}" type="datetime1">
               <a:rPr lang="en-US" smtClean="0"/>
-              <a:t>10/3/2014</a:t>
+              <a:t>6/5/2015</a:t>
             </a:fld>
             <a:endParaRPr lang="en-US" dirty="0"/>
           </a:p>
@@ -17546,45 +16431,7 @@
                 <a:ea typeface="Segoe UI" pitchFamily="34" charset="0"/>
                 <a:cs typeface="Segoe UI" pitchFamily="34" charset="0"/>
               </a:rPr>
-              <a:t>© 2012 Microsoft Corporation. All rights reserved. Microsoft, </a:t>
-            </a:r>
-            <a:r>
-              <a:rPr lang="en-US" sz="400" dirty="0" smtClean="0">
-                <a:gradFill>
-                  <a:gsLst>
-                    <a:gs pos="0">
-                      <a:prstClr val="black"/>
-                    </a:gs>
-                    <a:gs pos="100000">
-                      <a:prstClr val="black"/>
-                    </a:gs>
-                  </a:gsLst>
-                  <a:lin ang="5400000" scaled="0"/>
-                </a:gradFill>
-                <a:latin typeface="Segoe UI" pitchFamily="34" charset="0"/>
-                <a:ea typeface="Segoe UI" pitchFamily="34" charset="0"/>
-                <a:cs typeface="Segoe UI" pitchFamily="34" charset="0"/>
-              </a:rPr>
-              <a:t>Microsoft, </a:t>
-            </a:r>
-            <a:r>
-              <a:rPr lang="en-US" sz="400" dirty="0" smtClean="0">
-                <a:gradFill>
-                  <a:gsLst>
-                    <a:gs pos="0">
-                      <a:prstClr val="black"/>
-                    </a:gs>
-                    <a:gs pos="100000">
-                      <a:prstClr val="black"/>
-                    </a:gs>
-                  </a:gsLst>
-                  <a:lin ang="5400000" scaled="0"/>
-                </a:gradFill>
-                <a:latin typeface="Segoe UI" pitchFamily="34" charset="0"/>
-                <a:ea typeface="Segoe UI" pitchFamily="34" charset="0"/>
-                <a:cs typeface="Segoe UI" pitchFamily="34" charset="0"/>
-              </a:rPr>
-              <a:t>and other product names are or may be registered trademarks and/or trademarks in the U.S. and/or other countries.</a:t>
+              <a:t>© 2012 Microsoft Corporation. All rights reserved. Microsoft, Microsoft, and other product names are or may be registered trademarks and/or trademarks in the U.S. and/or other countries.</a:t>
             </a:r>
           </a:p>
           <a:p>
@@ -17628,7 +16475,7 @@
           <a:p>
             <a:fld id="{76D04415-B59E-4C7B-B9F3-190CA9C2CD82}" type="datetime1">
               <a:rPr lang="en-US" smtClean="0"/>
-              <a:t>10/3/2014</a:t>
+              <a:t>6/5/2015</a:t>
             </a:fld>
             <a:endParaRPr lang="en-US" dirty="0"/>
           </a:p>
@@ -38205,8 +37052,13 @@
             </a:pPr>
             <a:r>
               <a:rPr lang="en-US" dirty="0" smtClean="0"/>
-              <a:t>One Project: Web Forms, MVC, Web API</a:t>
+              <a:t>One Project: Web Forms, MVC, Web </a:t>
             </a:r>
+            <a:r>
+              <a:rPr lang="en-US" dirty="0" smtClean="0"/>
+              <a:t>API</a:t>
+            </a:r>
+            <a:endParaRPr lang="en-US" dirty="0" smtClean="0"/>
           </a:p>
           <a:p>
             <a:pPr marL="454418" lvl="1" indent="-227209">
@@ -38272,7 +37124,15 @@
             </a:br>
             <a:r>
               <a:rPr lang="en-US" sz="2400" dirty="0"/>
-              <a:t>SSO, Remote Debugging, Web Sites, </a:t>
+              <a:t>SSO, Remote Debugging, Web </a:t>
+            </a:r>
+            <a:r>
+              <a:rPr lang="en-US" sz="2400" dirty="0" smtClean="0"/>
+              <a:t>Apps, </a:t>
+            </a:r>
+            <a:r>
+              <a:rPr lang="en-US" sz="2400" dirty="0"/>
+              <a:t/>
             </a:r>
             <a:br>
               <a:rPr lang="en-US" sz="2400" dirty="0"/>
@@ -38282,8 +37142,12 @@
               <a:t>Mobile </a:t>
             </a:r>
             <a:r>
+              <a:rPr lang="en-US" sz="2400" dirty="0" smtClean="0"/>
+              <a:t>Apps, </a:t>
+            </a:r>
+            <a:r>
               <a:rPr lang="en-US" sz="2400" dirty="0"/>
-              <a:t>Services, Mgmt APIs, Log DL</a:t>
+              <a:t>Mgmt APIs, Log DL</a:t>
             </a:r>
           </a:p>
           <a:p>
@@ -43092,8 +41956,8 @@
         </p:blipFill>
         <p:spPr>
           <a:xfrm>
-            <a:off x="2794951" y="2058882"/>
-            <a:ext cx="6611516" cy="4110142"/>
+            <a:off x="3348701" y="2058882"/>
+            <a:ext cx="5504016" cy="4110142"/>
           </a:xfrm>
           <a:prstGeom prst="rect">
             <a:avLst/>

</xml_diff>